<commit_message>
experiments configurations and convergence slides added
</commit_message>
<xml_diff>
--- a/presentation.pptx
+++ b/presentation.pptx
@@ -14,9 +14,11 @@
     <p:sldId id="264" r:id="rId8"/>
     <p:sldId id="262" r:id="rId9"/>
     <p:sldId id="261" r:id="rId10"/>
-    <p:sldId id="260" r:id="rId11"/>
-    <p:sldId id="265" r:id="rId12"/>
-    <p:sldId id="268" r:id="rId13"/>
+    <p:sldId id="269" r:id="rId11"/>
+    <p:sldId id="260" r:id="rId12"/>
+    <p:sldId id="270" r:id="rId13"/>
+    <p:sldId id="265" r:id="rId14"/>
+    <p:sldId id="268" r:id="rId15"/>
   </p:sldIdLst>
   <p:sldSz cx="9144000" cy="6858000" type="screen4x3"/>
   <p:notesSz cx="6858000" cy="9144000"/>
@@ -299,7 +301,7 @@
           <a:p>
             <a:fld id="{561AC47D-3403-4C03-AAAC-0B66A0AC00B2}" type="datetimeFigureOut">
               <a:rPr lang="ru-RU" smtClean="0"/>
-              <a:t>24.05.2016</a:t>
+              <a:t>25.05.2016</a:t>
             </a:fld>
             <a:endParaRPr lang="ru-RU"/>
           </a:p>
@@ -469,7 +471,7 @@
           <a:p>
             <a:fld id="{561AC47D-3403-4C03-AAAC-0B66A0AC00B2}" type="datetimeFigureOut">
               <a:rPr lang="ru-RU" smtClean="0"/>
-              <a:t>24.05.2016</a:t>
+              <a:t>25.05.2016</a:t>
             </a:fld>
             <a:endParaRPr lang="ru-RU"/>
           </a:p>
@@ -649,7 +651,7 @@
           <a:p>
             <a:fld id="{561AC47D-3403-4C03-AAAC-0B66A0AC00B2}" type="datetimeFigureOut">
               <a:rPr lang="ru-RU" smtClean="0"/>
-              <a:t>24.05.2016</a:t>
+              <a:t>25.05.2016</a:t>
             </a:fld>
             <a:endParaRPr lang="ru-RU"/>
           </a:p>
@@ -819,7 +821,7 @@
           <a:p>
             <a:fld id="{561AC47D-3403-4C03-AAAC-0B66A0AC00B2}" type="datetimeFigureOut">
               <a:rPr lang="ru-RU" smtClean="0"/>
-              <a:t>24.05.2016</a:t>
+              <a:t>25.05.2016</a:t>
             </a:fld>
             <a:endParaRPr lang="ru-RU"/>
           </a:p>
@@ -1065,7 +1067,7 @@
           <a:p>
             <a:fld id="{561AC47D-3403-4C03-AAAC-0B66A0AC00B2}" type="datetimeFigureOut">
               <a:rPr lang="ru-RU" smtClean="0"/>
-              <a:t>24.05.2016</a:t>
+              <a:t>25.05.2016</a:t>
             </a:fld>
             <a:endParaRPr lang="ru-RU"/>
           </a:p>
@@ -1353,7 +1355,7 @@
           <a:p>
             <a:fld id="{561AC47D-3403-4C03-AAAC-0B66A0AC00B2}" type="datetimeFigureOut">
               <a:rPr lang="ru-RU" smtClean="0"/>
-              <a:t>24.05.2016</a:t>
+              <a:t>25.05.2016</a:t>
             </a:fld>
             <a:endParaRPr lang="ru-RU"/>
           </a:p>
@@ -1775,7 +1777,7 @@
           <a:p>
             <a:fld id="{561AC47D-3403-4C03-AAAC-0B66A0AC00B2}" type="datetimeFigureOut">
               <a:rPr lang="ru-RU" smtClean="0"/>
-              <a:t>24.05.2016</a:t>
+              <a:t>25.05.2016</a:t>
             </a:fld>
             <a:endParaRPr lang="ru-RU"/>
           </a:p>
@@ -1893,7 +1895,7 @@
           <a:p>
             <a:fld id="{561AC47D-3403-4C03-AAAC-0B66A0AC00B2}" type="datetimeFigureOut">
               <a:rPr lang="ru-RU" smtClean="0"/>
-              <a:t>24.05.2016</a:t>
+              <a:t>25.05.2016</a:t>
             </a:fld>
             <a:endParaRPr lang="ru-RU"/>
           </a:p>
@@ -1988,7 +1990,7 @@
           <a:p>
             <a:fld id="{561AC47D-3403-4C03-AAAC-0B66A0AC00B2}" type="datetimeFigureOut">
               <a:rPr lang="ru-RU" smtClean="0"/>
-              <a:t>24.05.2016</a:t>
+              <a:t>25.05.2016</a:t>
             </a:fld>
             <a:endParaRPr lang="ru-RU"/>
           </a:p>
@@ -2265,7 +2267,7 @@
           <a:p>
             <a:fld id="{561AC47D-3403-4C03-AAAC-0B66A0AC00B2}" type="datetimeFigureOut">
               <a:rPr lang="ru-RU" smtClean="0"/>
-              <a:t>24.05.2016</a:t>
+              <a:t>25.05.2016</a:t>
             </a:fld>
             <a:endParaRPr lang="ru-RU"/>
           </a:p>
@@ -2518,7 +2520,7 @@
           <a:p>
             <a:fld id="{561AC47D-3403-4C03-AAAC-0B66A0AC00B2}" type="datetimeFigureOut">
               <a:rPr lang="ru-RU" smtClean="0"/>
-              <a:t>24.05.2016</a:t>
+              <a:t>25.05.2016</a:t>
             </a:fld>
             <a:endParaRPr lang="ru-RU"/>
           </a:p>
@@ -2731,7 +2733,7 @@
           <a:p>
             <a:fld id="{561AC47D-3403-4C03-AAAC-0B66A0AC00B2}" type="datetimeFigureOut">
               <a:rPr lang="ru-RU" smtClean="0"/>
-              <a:t>24.05.2016</a:t>
+              <a:t>25.05.2016</a:t>
             </a:fld>
             <a:endParaRPr lang="ru-RU"/>
           </a:p>
@@ -3233,6 +3235,120 @@
           <a:chExt cx="0" cy="0"/>
         </a:xfrm>
       </p:grpSpPr>
+      <p:sp>
+        <p:nvSpPr>
+          <p:cNvPr id="2" name="Заголовок 1"/>
+          <p:cNvSpPr>
+            <a:spLocks noGrp="1"/>
+          </p:cNvSpPr>
+          <p:nvPr>
+            <p:ph type="title"/>
+          </p:nvPr>
+        </p:nvSpPr>
+        <p:spPr/>
+        <p:txBody>
+          <a:bodyPr>
+            <a:normAutofit fontScale="90000"/>
+          </a:bodyPr>
+          <a:lstStyle/>
+          <a:p>
+            <a:r>
+              <a:rPr lang="ru-RU" dirty="0" smtClean="0"/>
+              <a:t>Описание проделанных экспериментов</a:t>
+            </a:r>
+            <a:endParaRPr lang="ru-RU" dirty="0"/>
+          </a:p>
+        </p:txBody>
+      </p:sp>
+      <p:sp>
+        <p:nvSpPr>
+          <p:cNvPr id="3" name="Объект 2"/>
+          <p:cNvSpPr>
+            <a:spLocks noGrp="1"/>
+          </p:cNvSpPr>
+          <p:nvPr>
+            <p:ph idx="1"/>
+          </p:nvPr>
+        </p:nvSpPr>
+        <p:spPr/>
+        <p:txBody>
+          <a:bodyPr>
+            <a:normAutofit fontScale="92500" lnSpcReduction="20000"/>
+          </a:bodyPr>
+          <a:lstStyle/>
+          <a:p>
+            <a:r>
+              <a:rPr lang="ru-RU" dirty="0" smtClean="0"/>
+              <a:t>1. Базовая модель</a:t>
+            </a:r>
+          </a:p>
+          <a:p>
+            <a:r>
+              <a:rPr lang="ru-RU" dirty="0" smtClean="0"/>
+              <a:t>2. Отбор признаков + базовая модель</a:t>
+            </a:r>
+          </a:p>
+          <a:p>
+            <a:r>
+              <a:rPr lang="ru-RU" dirty="0" smtClean="0"/>
+              <a:t>3. Сеть релевантных признаков + базовая модель</a:t>
+            </a:r>
+          </a:p>
+          <a:p>
+            <a:r>
+              <a:rPr lang="en-US" dirty="0" smtClean="0"/>
+              <a:t>4. </a:t>
+            </a:r>
+            <a:r>
+              <a:rPr lang="ru-RU" dirty="0" smtClean="0"/>
+              <a:t>Составление сложных признаков + устойчивая модель</a:t>
+            </a:r>
+          </a:p>
+          <a:p>
+            <a:r>
+              <a:rPr lang="ru-RU" dirty="0" smtClean="0"/>
+              <a:t>5. Составление сложных признаков + отбор признаков + базовая модель</a:t>
+            </a:r>
+          </a:p>
+          <a:p>
+            <a:r>
+              <a:rPr lang="ru-RU" dirty="0" smtClean="0"/>
+              <a:t>6. Составление сложных признаков + сеть релевантных признаков + базовая модель</a:t>
+            </a:r>
+            <a:endParaRPr lang="ru-RU" dirty="0"/>
+          </a:p>
+        </p:txBody>
+      </p:sp>
+    </p:spTree>
+    <p:extLst>
+      <p:ext uri="{BB962C8B-B14F-4D97-AF65-F5344CB8AC3E}">
+        <p14:creationId xmlns:p14="http://schemas.microsoft.com/office/powerpoint/2010/main" val="2423009099"/>
+      </p:ext>
+    </p:extLst>
+  </p:cSld>
+  <p:clrMapOvr>
+    <a:masterClrMapping/>
+  </p:clrMapOvr>
+</p:sld>
+</file>
+
+<file path=ppt/slides/slide11.xml><?xml version="1.0" encoding="utf-8"?>
+<p:sld xmlns:a="http://schemas.openxmlformats.org/drawingml/2006/main" xmlns:r="http://schemas.openxmlformats.org/officeDocument/2006/relationships" xmlns:p="http://schemas.openxmlformats.org/presentationml/2006/main">
+  <p:cSld>
+    <p:spTree>
+      <p:nvGrpSpPr>
+        <p:cNvPr id="1" name=""/>
+        <p:cNvGrpSpPr/>
+        <p:nvPr/>
+      </p:nvGrpSpPr>
+      <p:grpSpPr>
+        <a:xfrm>
+          <a:off x="0" y="0"/>
+          <a:ext cx="0" cy="0"/>
+          <a:chOff x="0" y="0"/>
+          <a:chExt cx="0" cy="0"/>
+        </a:xfrm>
+      </p:grpSpPr>
       <p:graphicFrame>
         <p:nvGraphicFramePr>
           <p:cNvPr id="6" name="Объект 5"/>
@@ -5784,7 +5900,7 @@
 </p:sld>
 </file>
 
-<file path=ppt/slides/slide11.xml><?xml version="1.0" encoding="utf-8"?>
+<file path=ppt/slides/slide12.xml><?xml version="1.0" encoding="utf-8"?>
 <p:sld xmlns:a="http://schemas.openxmlformats.org/drawingml/2006/main" xmlns:r="http://schemas.openxmlformats.org/officeDocument/2006/relationships" xmlns:p="http://schemas.openxmlformats.org/presentationml/2006/main">
   <p:cSld>
     <p:spTree>
@@ -5818,6 +5934,100 @@
           <a:p>
             <a:r>
               <a:rPr lang="ru-RU" dirty="0" smtClean="0"/>
+              <a:t>Сходимость</a:t>
+            </a:r>
+            <a:endParaRPr lang="ru-RU" dirty="0"/>
+          </a:p>
+        </p:txBody>
+      </p:sp>
+      <p:pic>
+        <p:nvPicPr>
+          <p:cNvPr id="1033" name="Picture 9" descr="C:\Users\VOYO\Pictures\2ppt.png"/>
+          <p:cNvPicPr>
+            <a:picLocks noChangeAspect="1" noChangeArrowheads="1"/>
+          </p:cNvPicPr>
+          <p:nvPr/>
+        </p:nvPicPr>
+        <p:blipFill>
+          <a:blip r:embed="rId2">
+            <a:extLst>
+              <a:ext uri="{28A0092B-C50C-407E-A947-70E740481C1C}">
+                <a14:useLocalDpi xmlns:a14="http://schemas.microsoft.com/office/drawing/2010/main" val="0"/>
+              </a:ext>
+            </a:extLst>
+          </a:blip>
+          <a:srcRect/>
+          <a:stretch>
+            <a:fillRect/>
+          </a:stretch>
+        </p:blipFill>
+        <p:spPr bwMode="auto">
+          <a:xfrm>
+            <a:off x="1690354" y="1340768"/>
+            <a:ext cx="5511998" cy="5334478"/>
+          </a:xfrm>
+          <a:prstGeom prst="rect">
+            <a:avLst/>
+          </a:prstGeom>
+          <a:noFill/>
+          <a:extLst>
+            <a:ext uri="{909E8E84-426E-40DD-AFC4-6F175D3DCCD1}">
+              <a14:hiddenFill xmlns:a14="http://schemas.microsoft.com/office/drawing/2010/main">
+                <a:solidFill>
+                  <a:srgbClr val="FFFFFF"/>
+                </a:solidFill>
+              </a14:hiddenFill>
+            </a:ext>
+          </a:extLst>
+        </p:spPr>
+      </p:pic>
+    </p:spTree>
+    <p:extLst>
+      <p:ext uri="{BB962C8B-B14F-4D97-AF65-F5344CB8AC3E}">
+        <p14:creationId xmlns:p14="http://schemas.microsoft.com/office/powerpoint/2010/main" val="3615375193"/>
+      </p:ext>
+    </p:extLst>
+  </p:cSld>
+  <p:clrMapOvr>
+    <a:masterClrMapping/>
+  </p:clrMapOvr>
+</p:sld>
+</file>
+
+<file path=ppt/slides/slide13.xml><?xml version="1.0" encoding="utf-8"?>
+<p:sld xmlns:a="http://schemas.openxmlformats.org/drawingml/2006/main" xmlns:r="http://schemas.openxmlformats.org/officeDocument/2006/relationships" xmlns:p="http://schemas.openxmlformats.org/presentationml/2006/main">
+  <p:cSld>
+    <p:spTree>
+      <p:nvGrpSpPr>
+        <p:cNvPr id="1" name=""/>
+        <p:cNvGrpSpPr/>
+        <p:nvPr/>
+      </p:nvGrpSpPr>
+      <p:grpSpPr>
+        <a:xfrm>
+          <a:off x="0" y="0"/>
+          <a:ext cx="0" cy="0"/>
+          <a:chOff x="0" y="0"/>
+          <a:chExt cx="0" cy="0"/>
+        </a:xfrm>
+      </p:grpSpPr>
+      <p:sp>
+        <p:nvSpPr>
+          <p:cNvPr id="2" name="Заголовок 1"/>
+          <p:cNvSpPr>
+            <a:spLocks noGrp="1"/>
+          </p:cNvSpPr>
+          <p:nvPr>
+            <p:ph type="title"/>
+          </p:nvPr>
+        </p:nvSpPr>
+        <p:spPr/>
+        <p:txBody>
+          <a:bodyPr/>
+          <a:lstStyle/>
+          <a:p>
+            <a:r>
+              <a:rPr lang="ru-RU" dirty="0" smtClean="0"/>
               <a:t>Сделано в ходе работы</a:t>
             </a:r>
             <a:endParaRPr lang="ru-RU" dirty="0"/>
@@ -5908,7 +6118,7 @@
 </p:sld>
 </file>
 
-<file path=ppt/slides/slide12.xml><?xml version="1.0" encoding="utf-8"?>
+<file path=ppt/slides/slide14.xml><?xml version="1.0" encoding="utf-8"?>
 <p:sld xmlns:a="http://schemas.openxmlformats.org/drawingml/2006/main" xmlns:r="http://schemas.openxmlformats.org/officeDocument/2006/relationships" xmlns:p="http://schemas.openxmlformats.org/presentationml/2006/main">
   <p:cSld>
     <p:spTree>
@@ -6243,8 +6453,8 @@
           </a:p>
         </p:txBody>
       </p:sp>
-      <mc:AlternateContent xmlns:mc="http://schemas.openxmlformats.org/markup-compatibility/2006">
-        <mc:Choice xmlns:a14="http://schemas.microsoft.com/office/drawing/2010/main" Requires="a14">
+      <mc:AlternateContent xmlns:mc="http://schemas.openxmlformats.org/markup-compatibility/2006" xmlns:a14="http://schemas.microsoft.com/office/drawing/2010/main">
+        <mc:Choice Requires="a14">
           <p:sp>
             <p:nvSpPr>
               <p:cNvPr id="3" name="Объект 2"/>
@@ -6317,24 +6527,32 @@
                       <m:sSub>
                         <m:sSubPr>
                           <m:ctrlPr>
-                            <a:rPr lang="ru-RU" i="1"/>
+                            <a:rPr lang="ru-RU" i="1">
+                              <a:latin typeface="Cambria Math"/>
+                            </a:rPr>
                           </m:ctrlPr>
                         </m:sSubPr>
                         <m:e>
                           <m:r>
-                            <a:rPr lang="ru-RU" i="1"/>
+                            <a:rPr lang="ru-RU" i="1">
+                              <a:latin typeface="Cambria Math"/>
+                            </a:rPr>
                             <m:t>𝜃</m:t>
                           </m:r>
                         </m:e>
                         <m:sub>
                           <m:r>
-                            <a:rPr lang="en-US" i="1"/>
+                            <a:rPr lang="en-US" i="1">
+                              <a:latin typeface="Cambria Math"/>
+                            </a:rPr>
                             <m:t>𝑖</m:t>
                           </m:r>
                         </m:sub>
                       </m:sSub>
                       <m:r>
-                        <a:rPr lang="en-US" i="1"/>
+                        <a:rPr lang="en-US" i="1">
+                          <a:latin typeface="Cambria Math"/>
+                        </a:rPr>
                         <m:t>=</m:t>
                       </m:r>
                       <m:d>
@@ -6342,48 +6560,64 @@
                           <m:begChr m:val="|"/>
                           <m:endChr m:val="|"/>
                           <m:ctrlPr>
-                            <a:rPr lang="ru-RU" i="1"/>
+                            <a:rPr lang="ru-RU" i="1">
+                              <a:latin typeface="Cambria Math"/>
+                            </a:rPr>
                           </m:ctrlPr>
                         </m:dPr>
                         <m:e>
                           <m:sSub>
                             <m:sSubPr>
                               <m:ctrlPr>
-                                <a:rPr lang="ru-RU" i="1"/>
+                                <a:rPr lang="ru-RU" i="1">
+                                  <a:latin typeface="Cambria Math"/>
+                                </a:rPr>
                               </m:ctrlPr>
                             </m:sSubPr>
                             <m:e>
                               <m:r>
-                                <a:rPr lang="en-US" i="1"/>
+                                <a:rPr lang="en-US" i="1">
+                                  <a:latin typeface="Cambria Math"/>
+                                </a:rPr>
                                 <m:t>𝑋</m:t>
                               </m:r>
                             </m:e>
                             <m:sub>
                               <m:r>
-                                <a:rPr lang="en-US" i="1"/>
+                                <a:rPr lang="en-US" i="1">
+                                  <a:latin typeface="Cambria Math"/>
+                                </a:rPr>
                                 <m:t>𝑖</m:t>
                               </m:r>
                             </m:sub>
                           </m:sSub>
                           <m:r>
-                            <a:rPr lang="en-US" i="1"/>
+                            <a:rPr lang="en-US" i="1">
+                              <a:latin typeface="Cambria Math"/>
+                            </a:rPr>
                             <m:t>−</m:t>
                           </m:r>
                           <m:sSub>
                             <m:sSubPr>
                               <m:ctrlPr>
-                                <a:rPr lang="ru-RU" i="1"/>
+                                <a:rPr lang="ru-RU" i="1">
+                                  <a:latin typeface="Cambria Math"/>
+                                </a:rPr>
                               </m:ctrlPr>
                             </m:sSubPr>
                             <m:e>
                               <m:r>
-                                <a:rPr lang="en-US" i="1"/>
+                                <a:rPr lang="en-US" i="1">
+                                  <a:latin typeface="Cambria Math"/>
+                                </a:rPr>
                                 <m:t>𝑝</m:t>
                               </m:r>
                             </m:e>
                             <m:sub>
                               <m:r>
-                                <a:rPr lang="en-US" i="1"/>
+                                <a:rPr lang="en-US" i="1">
+                                  <a:latin typeface="Cambria Math"/>
+                                </a:rPr>
                                 <m:t>𝑖</m:t>
                               </m:r>
                             </m:sub>
@@ -6391,23 +6625,33 @@
                         </m:e>
                       </m:d>
                       <m:r>
-                        <a:rPr lang="en-US" i="1"/>
+                        <a:rPr lang="en-US" i="1">
+                          <a:latin typeface="Cambria Math"/>
+                        </a:rPr>
                         <m:t>, </m:t>
                       </m:r>
                       <m:r>
-                        <a:rPr lang="en-US" i="1"/>
+                        <a:rPr lang="en-US" i="1">
+                          <a:latin typeface="Cambria Math"/>
+                        </a:rPr>
                         <m:t>𝑖</m:t>
                       </m:r>
                       <m:r>
-                        <a:rPr lang="en-US" i="1"/>
+                        <a:rPr lang="en-US" i="1">
+                          <a:latin typeface="Cambria Math"/>
+                        </a:rPr>
                         <m:t>∈[1,</m:t>
                       </m:r>
                       <m:r>
-                        <a:rPr lang="en-US" i="1"/>
+                        <a:rPr lang="en-US" i="1">
+                          <a:latin typeface="Cambria Math"/>
+                        </a:rPr>
                         <m:t>𝑑</m:t>
                       </m:r>
                       <m:r>
-                        <a:rPr lang="en-US" i="1"/>
+                        <a:rPr lang="en-US" i="1">
+                          <a:latin typeface="Cambria Math"/>
+                        </a:rPr>
                         <m:t>]</m:t>
                       </m:r>
                     </m:oMath>
@@ -6424,28 +6668,38 @@
                     <m:sSub>
                       <m:sSubPr>
                         <m:ctrlPr>
-                          <a:rPr lang="ru-RU" i="1"/>
+                          <a:rPr lang="ru-RU" i="1">
+                            <a:latin typeface="Cambria Math"/>
+                          </a:rPr>
                         </m:ctrlPr>
                       </m:sSubPr>
                       <m:e>
                         <m:r>
-                          <a:rPr lang="en-US" i="1"/>
+                          <a:rPr lang="en-US" i="1">
+                            <a:latin typeface="Cambria Math"/>
+                          </a:rPr>
                           <m:t>𝜃</m:t>
                         </m:r>
                       </m:e>
                       <m:sub>
                         <m:r>
-                          <a:rPr lang="en-US" i="1"/>
+                          <a:rPr lang="en-US" i="1">
+                            <a:latin typeface="Cambria Math"/>
+                          </a:rPr>
                           <m:t>𝑖𝑗</m:t>
                         </m:r>
                       </m:sub>
                     </m:sSub>
                     <m:r>
-                      <a:rPr lang="ru-RU" i="1"/>
+                      <a:rPr lang="ru-RU" i="1">
+                        <a:latin typeface="Cambria Math"/>
+                      </a:rPr>
                       <m:t>=</m:t>
                     </m:r>
                     <m:r>
-                      <a:rPr lang="en-US" i="1"/>
+                      <a:rPr lang="en-US" i="1">
+                        <a:latin typeface="Cambria Math"/>
+                      </a:rPr>
                       <m:t>𝜆</m:t>
                     </m:r>
                     <m:d>
@@ -6453,25 +6707,33 @@
                         <m:begChr m:val="|"/>
                         <m:endChr m:val="|"/>
                         <m:ctrlPr>
-                          <a:rPr lang="ru-RU" i="1"/>
+                          <a:rPr lang="ru-RU" i="1">
+                            <a:latin typeface="Cambria Math"/>
+                          </a:rPr>
                         </m:ctrlPr>
                       </m:dPr>
                       <m:e>
                         <m:sSub>
                           <m:sSubPr>
                             <m:ctrlPr>
-                              <a:rPr lang="ru-RU" i="1"/>
+                              <a:rPr lang="ru-RU" i="1">
+                                <a:latin typeface="Cambria Math"/>
+                              </a:rPr>
                             </m:ctrlPr>
                           </m:sSubPr>
                           <m:e>
                             <m:r>
-                              <a:rPr lang="en-US" i="1"/>
+                              <a:rPr lang="en-US" i="1">
+                                <a:latin typeface="Cambria Math"/>
+                              </a:rPr>
                               <m:t>𝑟</m:t>
                             </m:r>
                           </m:e>
                           <m:sub>
                             <m:r>
-                              <a:rPr lang="en-US" i="1"/>
+                              <a:rPr lang="en-US" i="1">
+                                <a:latin typeface="Cambria Math"/>
+                              </a:rPr>
                               <m:t>𝑖𝑗</m:t>
                             </m:r>
                           </m:sub>
@@ -6479,53 +6741,71 @@
                       </m:e>
                     </m:d>
                     <m:r>
-                      <a:rPr lang="ru-RU" i="1"/>
+                      <a:rPr lang="ru-RU" i="1">
+                        <a:latin typeface="Cambria Math"/>
+                      </a:rPr>
                       <m:t>[</m:t>
                     </m:r>
                     <m:sSub>
                       <m:sSubPr>
                         <m:ctrlPr>
-                          <a:rPr lang="ru-RU" i="1"/>
+                          <a:rPr lang="ru-RU" i="1">
+                            <a:latin typeface="Cambria Math"/>
+                          </a:rPr>
                         </m:ctrlPr>
                       </m:sSubPr>
                       <m:e>
                         <m:r>
-                          <a:rPr lang="en-US" i="1"/>
+                          <a:rPr lang="en-US" i="1">
+                            <a:latin typeface="Cambria Math"/>
+                          </a:rPr>
                           <m:t>𝑋</m:t>
                         </m:r>
                       </m:e>
                       <m:sub>
                         <m:r>
-                          <a:rPr lang="en-US" i="1"/>
+                          <a:rPr lang="en-US" i="1">
+                            <a:latin typeface="Cambria Math"/>
+                          </a:rPr>
                           <m:t>𝑖</m:t>
                         </m:r>
                       </m:sub>
                     </m:sSub>
                     <m:r>
-                      <a:rPr lang="ru-RU" i="1"/>
+                      <a:rPr lang="ru-RU" i="1">
+                        <a:latin typeface="Cambria Math"/>
+                      </a:rPr>
                       <m:t>≠</m:t>
                     </m:r>
                     <m:sSub>
                       <m:sSubPr>
                         <m:ctrlPr>
-                          <a:rPr lang="ru-RU" i="1"/>
+                          <a:rPr lang="ru-RU" i="1">
+                            <a:latin typeface="Cambria Math"/>
+                          </a:rPr>
                         </m:ctrlPr>
                       </m:sSubPr>
                       <m:e>
                         <m:r>
-                          <a:rPr lang="en-US" i="1"/>
+                          <a:rPr lang="en-US" i="1">
+                            <a:latin typeface="Cambria Math"/>
+                          </a:rPr>
                           <m:t>𝑋</m:t>
                         </m:r>
                       </m:e>
                       <m:sub>
                         <m:r>
-                          <a:rPr lang="en-US" i="1"/>
+                          <a:rPr lang="en-US" i="1">
+                            <a:latin typeface="Cambria Math"/>
+                          </a:rPr>
                           <m:t>𝑗</m:t>
                         </m:r>
                       </m:sub>
                     </m:sSub>
                     <m:r>
-                      <a:rPr lang="ru-RU" i="1"/>
+                      <a:rPr lang="ru-RU" i="1">
+                        <a:latin typeface="Cambria Math"/>
+                      </a:rPr>
                       <m:t>]</m:t>
                     </m:r>
                   </m:oMath>
@@ -6560,7 +6840,7 @@
             </p:txBody>
           </p:sp>
         </mc:Choice>
-        <mc:Fallback>
+        <mc:Fallback xmlns="">
           <p:sp>
             <p:nvSpPr>
               <p:cNvPr id="3" name="Объект 2"/>
@@ -7906,7 +8186,7 @@
         </p:nvGraphicFramePr>
         <p:xfrm>
           <a:off x="1941195" y="2034381"/>
-          <a:ext cx="5261610" cy="3498476"/>
+          <a:ext cx="5261610" cy="3657600"/>
         </p:xfrm>
         <a:graphic>
           <a:graphicData uri="http://schemas.openxmlformats.org/drawingml/2006/table">

</xml_diff>